<commit_message>
Updated presentation slides and script
</commit_message>
<xml_diff>
--- a/DataMiningProject/docs/presentation.pptx
+++ b/DataMiningProject/docs/presentation.pptx
@@ -9,18 +9,25 @@
     <p:sldId id="257" r:id="rId3"/>
     <p:sldId id="258" r:id="rId4"/>
     <p:sldId id="264" r:id="rId5"/>
-    <p:sldId id="259" r:id="rId6"/>
-    <p:sldId id="260" r:id="rId7"/>
-    <p:sldId id="261" r:id="rId8"/>
-    <p:sldId id="262" r:id="rId9"/>
-    <p:sldId id="266" r:id="rId10"/>
-    <p:sldId id="267" r:id="rId11"/>
-    <p:sldId id="268" r:id="rId12"/>
-    <p:sldId id="270" r:id="rId13"/>
-    <p:sldId id="271" r:id="rId14"/>
-    <p:sldId id="272" r:id="rId15"/>
-    <p:sldId id="273" r:id="rId16"/>
-    <p:sldId id="274" r:id="rId17"/>
+    <p:sldId id="282" r:id="rId6"/>
+    <p:sldId id="283" r:id="rId7"/>
+    <p:sldId id="259" r:id="rId8"/>
+    <p:sldId id="275" r:id="rId9"/>
+    <p:sldId id="276" r:id="rId10"/>
+    <p:sldId id="280" r:id="rId11"/>
+    <p:sldId id="277" r:id="rId12"/>
+    <p:sldId id="278" r:id="rId13"/>
+    <p:sldId id="281" r:id="rId14"/>
+    <p:sldId id="261" r:id="rId15"/>
+    <p:sldId id="262" r:id="rId16"/>
+    <p:sldId id="266" r:id="rId17"/>
+    <p:sldId id="267" r:id="rId18"/>
+    <p:sldId id="268" r:id="rId19"/>
+    <p:sldId id="270" r:id="rId20"/>
+    <p:sldId id="271" r:id="rId21"/>
+    <p:sldId id="272" r:id="rId22"/>
+    <p:sldId id="273" r:id="rId23"/>
+    <p:sldId id="274" r:id="rId24"/>
   </p:sldIdLst>
   <p:sldSz cx="12192000" cy="6858000"/>
   <p:notesSz cx="6858000" cy="9144000"/>
@@ -132,12 +139,19 @@
           <p14:sldIdLst>
             <p14:sldId id="258"/>
             <p14:sldId id="264"/>
+            <p14:sldId id="282"/>
+            <p14:sldId id="283"/>
             <p14:sldId id="259"/>
           </p14:sldIdLst>
         </p14:section>
         <p14:section name="ID3" id="{6B816721-07E9-457C-B1F7-AA365E26E3A0}">
           <p14:sldIdLst>
-            <p14:sldId id="260"/>
+            <p14:sldId id="275"/>
+            <p14:sldId id="276"/>
+            <p14:sldId id="280"/>
+            <p14:sldId id="277"/>
+            <p14:sldId id="278"/>
+            <p14:sldId id="281"/>
             <p14:sldId id="261"/>
           </p14:sldIdLst>
         </p14:section>
@@ -5774,6 +5788,13 @@
   <p:clrMapOvr>
     <a:masterClrMapping/>
   </p:clrMapOvr>
+  <p:timing>
+    <p:tnLst>
+      <p:par>
+        <p:cTn id="1" dur="indefinite" restart="never" nodeType="tmRoot"/>
+      </p:par>
+    </p:tnLst>
+  </p:timing>
 </p:sld>
 </file>
 
@@ -5806,54 +5827,150 @@
         </p:nvSpPr>
         <p:spPr>
           <a:xfrm>
-            <a:off x="1141413" y="135980"/>
-            <a:ext cx="9905998" cy="1049079"/>
-          </a:xfrm>
-        </p:spPr>
-        <p:txBody>
-          <a:bodyPr/>
-          <a:lstStyle/>
-          <a:p>
-            <a:r>
-              <a:rPr lang="en-US" dirty="0"/>
-              <a:t>What X-means Does</a:t>
-            </a:r>
+            <a:off x="603681" y="1046292"/>
+            <a:ext cx="3768969" cy="707048"/>
+          </a:xfrm>
+        </p:spPr>
+        <p:txBody>
+          <a:bodyPr>
+            <a:normAutofit/>
+          </a:bodyPr>
+          <a:lstStyle/>
+          <a:p>
+            <a:r>
+              <a:rPr lang="en-US" dirty="0" smtClean="0"/>
+              <a:t>Information Gain</a:t>
+            </a:r>
+            <a:endParaRPr lang="en-US" dirty="0"/>
           </a:p>
         </p:txBody>
       </p:sp>
       <p:pic>
         <p:nvPicPr>
-          <p:cNvPr id="4" name="Content Placeholder 3"/>
+          <p:cNvPr id="5" name="Picture Placeholder 4"/>
           <p:cNvPicPr>
             <a:picLocks noGrp="1" noChangeAspect="1"/>
           </p:cNvPicPr>
           <p:nvPr>
-            <p:ph idx="1"/>
-          </p:nvPr>
+            <p:ph type="pic" idx="1"/>
+          </p:nvPr>
+        </p:nvPicPr>
+        <p:blipFill rotWithShape="1">
+          <a:blip r:embed="rId2">
+            <a:extLst>
+              <a:ext uri="{28A0092B-C50C-407E-A947-70E740481C1C}">
+                <a14:useLocalDpi xmlns:a14="http://schemas.microsoft.com/office/drawing/2010/main" val="0"/>
+              </a:ext>
+            </a:extLst>
+          </a:blip>
+          <a:srcRect r="19494" b="4597"/>
+          <a:stretch/>
+        </p:blipFill>
+        <p:spPr>
+          <a:xfrm>
+            <a:off x="5018842" y="0"/>
+            <a:ext cx="7173158" cy="6891489"/>
+          </a:xfrm>
+        </p:spPr>
+      </p:pic>
+      <p:pic>
+        <p:nvPicPr>
+          <p:cNvPr id="3" name="Picture 2"/>
+          <p:cNvPicPr>
+            <a:picLocks noChangeAspect="1"/>
+          </p:cNvPicPr>
+          <p:nvPr/>
         </p:nvPicPr>
         <p:blipFill>
-          <a:blip r:embed="rId2"/>
+          <a:blip r:embed="rId3">
+            <a:extLst>
+              <a:ext uri="{28A0092B-C50C-407E-A947-70E740481C1C}">
+                <a14:useLocalDpi xmlns:a14="http://schemas.microsoft.com/office/drawing/2010/main" val="0"/>
+              </a:ext>
+            </a:extLst>
+          </a:blip>
           <a:stretch>
             <a:fillRect/>
           </a:stretch>
         </p:blipFill>
         <p:spPr>
           <a:xfrm>
-            <a:off x="86114" y="980696"/>
-            <a:ext cx="7858260" cy="5902127"/>
-          </a:xfrm>
+            <a:off x="481811" y="2103316"/>
+            <a:ext cx="4012707" cy="724456"/>
+          </a:xfrm>
+          <a:prstGeom prst="rect">
+            <a:avLst/>
+          </a:prstGeom>
         </p:spPr>
       </p:pic>
+      <p:sp>
+        <p:nvSpPr>
+          <p:cNvPr id="4" name="TextBox 3"/>
+          <p:cNvSpPr txBox="1"/>
+          <p:nvPr/>
+        </p:nvSpPr>
+        <p:spPr>
+          <a:xfrm>
+            <a:off x="942908" y="3355760"/>
+            <a:ext cx="3752838" cy="923330"/>
+          </a:xfrm>
+          <a:prstGeom prst="rect">
+            <a:avLst/>
+          </a:prstGeom>
+          <a:noFill/>
+        </p:spPr>
+        <p:txBody>
+          <a:bodyPr wrap="square" rtlCol="0">
+            <a:spAutoFit/>
+          </a:bodyPr>
+          <a:lstStyle/>
+          <a:p>
+            <a:r>
+              <a:rPr lang="en-US" dirty="0" smtClean="0"/>
+              <a:t>Info(D) = entropy</a:t>
+            </a:r>
+          </a:p>
+          <a:p>
+            <a:endParaRPr lang="en-US" dirty="0" smtClean="0"/>
+          </a:p>
+          <a:p>
+            <a:r>
+              <a:rPr lang="en-US" dirty="0" err="1" smtClean="0"/>
+              <a:t>Info</a:t>
+            </a:r>
+            <a:r>
+              <a:rPr lang="en-US" baseline="-25000" dirty="0" err="1" smtClean="0"/>
+              <a:t>A</a:t>
+            </a:r>
+            <a:r>
+              <a:rPr lang="en-US" dirty="0" smtClean="0"/>
+              <a:t>(D) = </a:t>
+            </a:r>
+            <a:r>
+              <a:rPr lang="en-US" dirty="0" err="1" smtClean="0"/>
+              <a:t>entropyAfterSplit</a:t>
+            </a:r>
+            <a:endParaRPr lang="en-US" dirty="0"/>
+          </a:p>
+        </p:txBody>
+      </p:sp>
     </p:spTree>
     <p:extLst>
       <p:ext uri="{BB962C8B-B14F-4D97-AF65-F5344CB8AC3E}">
-        <p14:creationId xmlns:p14="http://schemas.microsoft.com/office/powerpoint/2010/main" val="552237662"/>
+        <p14:creationId xmlns:p14="http://schemas.microsoft.com/office/powerpoint/2010/main" val="2445481632"/>
       </p:ext>
     </p:extLst>
   </p:cSld>
   <p:clrMapOvr>
     <a:masterClrMapping/>
   </p:clrMapOvr>
+  <p:timing>
+    <p:tnLst>
+      <p:par>
+        <p:cTn id="1" dur="indefinite" restart="never" nodeType="tmRoot"/>
+      </p:par>
+    </p:tnLst>
+  </p:timing>
 </p:sld>
 </file>
 
@@ -5886,6 +6003,865 @@
         </p:nvSpPr>
         <p:spPr>
           <a:xfrm>
+            <a:off x="1575389" y="4531716"/>
+            <a:ext cx="3768969" cy="707048"/>
+          </a:xfrm>
+        </p:spPr>
+        <p:txBody>
+          <a:bodyPr>
+            <a:normAutofit/>
+          </a:bodyPr>
+          <a:lstStyle/>
+          <a:p>
+            <a:r>
+              <a:rPr lang="en-US" dirty="0" smtClean="0"/>
+              <a:t>Information Gain</a:t>
+            </a:r>
+            <a:endParaRPr lang="en-US" dirty="0"/>
+          </a:p>
+        </p:txBody>
+      </p:sp>
+      <p:pic>
+        <p:nvPicPr>
+          <p:cNvPr id="5" name="Picture Placeholder 4"/>
+          <p:cNvPicPr>
+            <a:picLocks noGrp="1" noChangeAspect="1"/>
+          </p:cNvPicPr>
+          <p:nvPr>
+            <p:ph type="pic" idx="1"/>
+          </p:nvPr>
+        </p:nvPicPr>
+        <p:blipFill rotWithShape="1">
+          <a:blip r:embed="rId2">
+            <a:extLst>
+              <a:ext uri="{28A0092B-C50C-407E-A947-70E740481C1C}">
+                <a14:useLocalDpi xmlns:a14="http://schemas.microsoft.com/office/drawing/2010/main" val="0"/>
+              </a:ext>
+            </a:extLst>
+          </a:blip>
+          <a:srcRect t="-209" b="-113"/>
+          <a:stretch/>
+        </p:blipFill>
+        <p:spPr>
+          <a:xfrm>
+            <a:off x="660265" y="0"/>
+            <a:ext cx="10909300" cy="3870663"/>
+          </a:xfrm>
+        </p:spPr>
+      </p:pic>
+      <p:pic>
+        <p:nvPicPr>
+          <p:cNvPr id="6" name="Picture 5"/>
+          <p:cNvPicPr>
+            <a:picLocks noChangeAspect="1"/>
+          </p:cNvPicPr>
+          <p:nvPr/>
+        </p:nvPicPr>
+        <p:blipFill>
+          <a:blip r:embed="rId3">
+            <a:extLst>
+              <a:ext uri="{28A0092B-C50C-407E-A947-70E740481C1C}">
+                <a14:useLocalDpi xmlns:a14="http://schemas.microsoft.com/office/drawing/2010/main" val="0"/>
+              </a:ext>
+            </a:extLst>
+          </a:blip>
+          <a:stretch>
+            <a:fillRect/>
+          </a:stretch>
+        </p:blipFill>
+        <p:spPr>
+          <a:xfrm>
+            <a:off x="5699466" y="4242857"/>
+            <a:ext cx="4580877" cy="1338032"/>
+          </a:xfrm>
+          <a:prstGeom prst="rect">
+            <a:avLst/>
+          </a:prstGeom>
+        </p:spPr>
+      </p:pic>
+    </p:spTree>
+    <p:extLst>
+      <p:ext uri="{BB962C8B-B14F-4D97-AF65-F5344CB8AC3E}">
+        <p14:creationId xmlns:p14="http://schemas.microsoft.com/office/powerpoint/2010/main" val="1202358216"/>
+      </p:ext>
+    </p:extLst>
+  </p:cSld>
+  <p:clrMapOvr>
+    <a:masterClrMapping/>
+  </p:clrMapOvr>
+  <p:timing>
+    <p:tnLst>
+      <p:par>
+        <p:cTn id="1" dur="indefinite" restart="never" nodeType="tmRoot"/>
+      </p:par>
+    </p:tnLst>
+  </p:timing>
+</p:sld>
+</file>
+
+<file path=ppt/slides/slide12.xml><?xml version="1.0" encoding="utf-8"?>
+<p:sld xmlns:a="http://schemas.openxmlformats.org/drawingml/2006/main" xmlns:r="http://schemas.openxmlformats.org/officeDocument/2006/relationships" xmlns:p="http://schemas.openxmlformats.org/presentationml/2006/main">
+  <p:cSld>
+    <p:spTree>
+      <p:nvGrpSpPr>
+        <p:cNvPr id="1" name=""/>
+        <p:cNvGrpSpPr/>
+        <p:nvPr/>
+      </p:nvGrpSpPr>
+      <p:grpSpPr>
+        <a:xfrm>
+          <a:off x="0" y="0"/>
+          <a:ext cx="0" cy="0"/>
+          <a:chOff x="0" y="0"/>
+          <a:chExt cx="0" cy="0"/>
+        </a:xfrm>
+      </p:grpSpPr>
+      <p:sp>
+        <p:nvSpPr>
+          <p:cNvPr id="2" name="Title 1"/>
+          <p:cNvSpPr>
+            <a:spLocks noGrp="1"/>
+          </p:cNvSpPr>
+          <p:nvPr>
+            <p:ph type="title"/>
+          </p:nvPr>
+        </p:nvSpPr>
+        <p:spPr>
+          <a:xfrm>
+            <a:off x="1264670" y="5863366"/>
+            <a:ext cx="3768969" cy="707048"/>
+          </a:xfrm>
+        </p:spPr>
+        <p:txBody>
+          <a:bodyPr>
+            <a:normAutofit/>
+          </a:bodyPr>
+          <a:lstStyle/>
+          <a:p>
+            <a:r>
+              <a:rPr lang="en-US" dirty="0" smtClean="0"/>
+              <a:t>Information Gain</a:t>
+            </a:r>
+            <a:endParaRPr lang="en-US" dirty="0"/>
+          </a:p>
+        </p:txBody>
+      </p:sp>
+      <p:pic>
+        <p:nvPicPr>
+          <p:cNvPr id="5" name="Picture Placeholder 4"/>
+          <p:cNvPicPr>
+            <a:picLocks noGrp="1" noChangeAspect="1"/>
+          </p:cNvPicPr>
+          <p:nvPr>
+            <p:ph type="pic" idx="1"/>
+          </p:nvPr>
+        </p:nvPicPr>
+        <p:blipFill>
+          <a:blip r:embed="rId2">
+            <a:extLst>
+              <a:ext uri="{28A0092B-C50C-407E-A947-70E740481C1C}">
+                <a14:useLocalDpi xmlns:a14="http://schemas.microsoft.com/office/drawing/2010/main" val="0"/>
+              </a:ext>
+            </a:extLst>
+          </a:blip>
+          <a:stretch>
+            <a:fillRect/>
+          </a:stretch>
+        </p:blipFill>
+        <p:spPr>
+          <a:xfrm>
+            <a:off x="692917" y="0"/>
+            <a:ext cx="10768155" cy="5644051"/>
+          </a:xfrm>
+        </p:spPr>
+      </p:pic>
+      <p:pic>
+        <p:nvPicPr>
+          <p:cNvPr id="3" name="Picture 2"/>
+          <p:cNvPicPr>
+            <a:picLocks noChangeAspect="1"/>
+          </p:cNvPicPr>
+          <p:nvPr/>
+        </p:nvPicPr>
+        <p:blipFill>
+          <a:blip r:embed="rId3">
+            <a:extLst>
+              <a:ext uri="{28A0092B-C50C-407E-A947-70E740481C1C}">
+                <a14:useLocalDpi xmlns:a14="http://schemas.microsoft.com/office/drawing/2010/main" val="0"/>
+              </a:ext>
+            </a:extLst>
+          </a:blip>
+          <a:stretch>
+            <a:fillRect/>
+          </a:stretch>
+        </p:blipFill>
+        <p:spPr>
+          <a:xfrm>
+            <a:off x="5823752" y="5261763"/>
+            <a:ext cx="4761390" cy="1203207"/>
+          </a:xfrm>
+          <a:prstGeom prst="rect">
+            <a:avLst/>
+          </a:prstGeom>
+        </p:spPr>
+      </p:pic>
+    </p:spTree>
+    <p:extLst>
+      <p:ext uri="{BB962C8B-B14F-4D97-AF65-F5344CB8AC3E}">
+        <p14:creationId xmlns:p14="http://schemas.microsoft.com/office/powerpoint/2010/main" val="1477431824"/>
+      </p:ext>
+    </p:extLst>
+  </p:cSld>
+  <p:clrMapOvr>
+    <a:masterClrMapping/>
+  </p:clrMapOvr>
+  <p:timing>
+    <p:tnLst>
+      <p:par>
+        <p:cTn id="1" dur="indefinite" restart="never" nodeType="tmRoot"/>
+      </p:par>
+    </p:tnLst>
+  </p:timing>
+</p:sld>
+</file>
+
+<file path=ppt/slides/slide13.xml><?xml version="1.0" encoding="utf-8"?>
+<p:sld xmlns:a="http://schemas.openxmlformats.org/drawingml/2006/main" xmlns:r="http://schemas.openxmlformats.org/officeDocument/2006/relationships" xmlns:p="http://schemas.openxmlformats.org/presentationml/2006/main">
+  <p:cSld>
+    <p:spTree>
+      <p:nvGrpSpPr>
+        <p:cNvPr id="1" name=""/>
+        <p:cNvGrpSpPr/>
+        <p:nvPr/>
+      </p:nvGrpSpPr>
+      <p:grpSpPr>
+        <a:xfrm>
+          <a:off x="0" y="0"/>
+          <a:ext cx="0" cy="0"/>
+          <a:chOff x="0" y="0"/>
+          <a:chExt cx="0" cy="0"/>
+        </a:xfrm>
+      </p:grpSpPr>
+      <p:sp>
+        <p:nvSpPr>
+          <p:cNvPr id="2" name="Title 1"/>
+          <p:cNvSpPr>
+            <a:spLocks noGrp="1"/>
+          </p:cNvSpPr>
+          <p:nvPr>
+            <p:ph type="title"/>
+          </p:nvPr>
+        </p:nvSpPr>
+        <p:spPr>
+          <a:xfrm>
+            <a:off x="761729" y="4584982"/>
+            <a:ext cx="3129776" cy="707048"/>
+          </a:xfrm>
+        </p:spPr>
+        <p:txBody>
+          <a:bodyPr>
+            <a:normAutofit/>
+          </a:bodyPr>
+          <a:lstStyle/>
+          <a:p>
+            <a:r>
+              <a:rPr lang="en-US" dirty="0" smtClean="0"/>
+              <a:t>Node: Classify</a:t>
+            </a:r>
+            <a:endParaRPr lang="en-US" dirty="0"/>
+          </a:p>
+        </p:txBody>
+      </p:sp>
+      <p:pic>
+        <p:nvPicPr>
+          <p:cNvPr id="5" name="Picture Placeholder 4"/>
+          <p:cNvPicPr>
+            <a:picLocks noGrp="1" noChangeAspect="1"/>
+          </p:cNvPicPr>
+          <p:nvPr>
+            <p:ph type="pic" idx="1"/>
+          </p:nvPr>
+        </p:nvPicPr>
+        <p:blipFill>
+          <a:blip r:embed="rId2">
+            <a:extLst>
+              <a:ext uri="{28A0092B-C50C-407E-A947-70E740481C1C}">
+                <a14:useLocalDpi xmlns:a14="http://schemas.microsoft.com/office/drawing/2010/main" val="0"/>
+              </a:ext>
+            </a:extLst>
+          </a:blip>
+          <a:stretch>
+            <a:fillRect/>
+          </a:stretch>
+        </p:blipFill>
+        <p:spPr>
+          <a:xfrm>
+            <a:off x="584176" y="79900"/>
+            <a:ext cx="11402640" cy="3710142"/>
+          </a:xfrm>
+        </p:spPr>
+      </p:pic>
+      <p:pic>
+        <p:nvPicPr>
+          <p:cNvPr id="3" name="Picture 2"/>
+          <p:cNvPicPr>
+            <a:picLocks noChangeAspect="1"/>
+          </p:cNvPicPr>
+          <p:nvPr/>
+        </p:nvPicPr>
+        <p:blipFill>
+          <a:blip r:embed="rId3"/>
+          <a:stretch>
+            <a:fillRect/>
+          </a:stretch>
+        </p:blipFill>
+        <p:spPr>
+          <a:xfrm>
+            <a:off x="4347177" y="2857886"/>
+            <a:ext cx="6847565" cy="3717250"/>
+          </a:xfrm>
+          <a:prstGeom prst="rect">
+            <a:avLst/>
+          </a:prstGeom>
+        </p:spPr>
+      </p:pic>
+    </p:spTree>
+    <p:extLst>
+      <p:ext uri="{BB962C8B-B14F-4D97-AF65-F5344CB8AC3E}">
+        <p14:creationId xmlns:p14="http://schemas.microsoft.com/office/powerpoint/2010/main" val="1151239193"/>
+      </p:ext>
+    </p:extLst>
+  </p:cSld>
+  <p:clrMapOvr>
+    <a:masterClrMapping/>
+  </p:clrMapOvr>
+  <p:timing>
+    <p:tnLst>
+      <p:par>
+        <p:cTn id="1" dur="indefinite" restart="never" nodeType="tmRoot"/>
+      </p:par>
+    </p:tnLst>
+  </p:timing>
+</p:sld>
+</file>
+
+<file path=ppt/slides/slide14.xml><?xml version="1.0" encoding="utf-8"?>
+<p:sld xmlns:a="http://schemas.openxmlformats.org/drawingml/2006/main" xmlns:r="http://schemas.openxmlformats.org/officeDocument/2006/relationships" xmlns:p="http://schemas.openxmlformats.org/presentationml/2006/main">
+  <p:cSld>
+    <p:spTree>
+      <p:nvGrpSpPr>
+        <p:cNvPr id="1" name=""/>
+        <p:cNvGrpSpPr/>
+        <p:nvPr/>
+      </p:nvGrpSpPr>
+      <p:grpSpPr>
+        <a:xfrm>
+          <a:off x="0" y="0"/>
+          <a:ext cx="0" cy="0"/>
+          <a:chOff x="0" y="0"/>
+          <a:chExt cx="0" cy="0"/>
+        </a:xfrm>
+      </p:grpSpPr>
+      <p:sp>
+        <p:nvSpPr>
+          <p:cNvPr id="2" name="Title 1"/>
+          <p:cNvSpPr>
+            <a:spLocks noGrp="1"/>
+          </p:cNvSpPr>
+          <p:nvPr>
+            <p:ph type="title"/>
+          </p:nvPr>
+        </p:nvSpPr>
+        <p:spPr>
+          <a:xfrm>
+            <a:off x="925903" y="0"/>
+            <a:ext cx="2153306" cy="625549"/>
+          </a:xfrm>
+        </p:spPr>
+        <p:txBody>
+          <a:bodyPr/>
+          <a:lstStyle/>
+          <a:p>
+            <a:r>
+              <a:rPr lang="en-US" dirty="0"/>
+              <a:t>ID3 Output</a:t>
+            </a:r>
+          </a:p>
+        </p:txBody>
+      </p:sp>
+      <p:pic>
+        <p:nvPicPr>
+          <p:cNvPr id="12" name="Picture Placeholder 11"/>
+          <p:cNvPicPr>
+            <a:picLocks noGrp="1" noChangeAspect="1"/>
+          </p:cNvPicPr>
+          <p:nvPr>
+            <p:ph type="pic" idx="1"/>
+          </p:nvPr>
+        </p:nvPicPr>
+        <p:blipFill>
+          <a:blip r:embed="rId2">
+            <a:extLst>
+              <a:ext uri="{28A0092B-C50C-407E-A947-70E740481C1C}">
+                <a14:useLocalDpi xmlns:a14="http://schemas.microsoft.com/office/drawing/2010/main" val="0"/>
+              </a:ext>
+            </a:extLst>
+          </a:blip>
+          <a:srcRect l="127" r="127"/>
+          <a:stretch>
+            <a:fillRect/>
+          </a:stretch>
+        </p:blipFill>
+        <p:spPr>
+          <a:xfrm>
+            <a:off x="4054475" y="-19050"/>
+            <a:ext cx="8137525" cy="6904038"/>
+          </a:xfrm>
+        </p:spPr>
+      </p:pic>
+      <p:sp>
+        <p:nvSpPr>
+          <p:cNvPr id="6" name="Text Placeholder 5"/>
+          <p:cNvSpPr>
+            <a:spLocks noGrp="1"/>
+          </p:cNvSpPr>
+          <p:nvPr>
+            <p:ph type="body" sz="half" idx="2"/>
+          </p:nvPr>
+        </p:nvSpPr>
+        <p:spPr>
+          <a:xfrm>
+            <a:off x="483217" y="3532313"/>
+            <a:ext cx="3090347" cy="2725479"/>
+          </a:xfrm>
+        </p:spPr>
+        <p:txBody>
+          <a:bodyPr>
+            <a:normAutofit/>
+          </a:bodyPr>
+          <a:lstStyle/>
+          <a:p>
+            <a:r>
+              <a:rPr lang="en-US" dirty="0"/>
+              <a:t>Input: </a:t>
+            </a:r>
+            <a:r>
+              <a:rPr lang="en-US" dirty="0" smtClean="0"/>
+              <a:t>Student </a:t>
+            </a:r>
+            <a:r>
+              <a:rPr lang="en-US" dirty="0" smtClean="0"/>
+              <a:t>Loan Data</a:t>
+            </a:r>
+            <a:endParaRPr lang="en-US" dirty="0"/>
+          </a:p>
+          <a:p>
+            <a:endParaRPr lang="en-US" dirty="0"/>
+          </a:p>
+          <a:p>
+            <a:r>
+              <a:rPr lang="en-US" dirty="0" smtClean="0"/>
+              <a:t>Parameters</a:t>
+            </a:r>
+          </a:p>
+          <a:p>
+            <a:r>
+              <a:rPr lang="en-US" dirty="0"/>
+              <a:t>	</a:t>
+            </a:r>
+            <a:r>
+              <a:rPr lang="en-US" dirty="0" smtClean="0"/>
+              <a:t>Class Index: 4</a:t>
+            </a:r>
+            <a:endParaRPr lang="en-US" dirty="0"/>
+          </a:p>
+        </p:txBody>
+      </p:sp>
+      <p:pic>
+        <p:nvPicPr>
+          <p:cNvPr id="14" name="Picture 13"/>
+          <p:cNvPicPr>
+            <a:picLocks noChangeAspect="1"/>
+          </p:cNvPicPr>
+          <p:nvPr/>
+        </p:nvPicPr>
+        <p:blipFill>
+          <a:blip r:embed="rId3">
+            <a:extLst>
+              <a:ext uri="{28A0092B-C50C-407E-A947-70E740481C1C}">
+                <a14:useLocalDpi xmlns:a14="http://schemas.microsoft.com/office/drawing/2010/main" val="0"/>
+              </a:ext>
+            </a:extLst>
+          </a:blip>
+          <a:stretch>
+            <a:fillRect/>
+          </a:stretch>
+        </p:blipFill>
+        <p:spPr>
+          <a:xfrm>
+            <a:off x="0" y="829735"/>
+            <a:ext cx="4056782" cy="2202957"/>
+          </a:xfrm>
+          <a:prstGeom prst="rect">
+            <a:avLst/>
+          </a:prstGeom>
+        </p:spPr>
+      </p:pic>
+    </p:spTree>
+    <p:extLst>
+      <p:ext uri="{BB962C8B-B14F-4D97-AF65-F5344CB8AC3E}">
+        <p14:creationId xmlns:p14="http://schemas.microsoft.com/office/powerpoint/2010/main" val="2396371313"/>
+      </p:ext>
+    </p:extLst>
+  </p:cSld>
+  <p:clrMapOvr>
+    <a:masterClrMapping/>
+  </p:clrMapOvr>
+  <p:timing>
+    <p:tnLst>
+      <p:par>
+        <p:cTn id="1" dur="indefinite" restart="never" nodeType="tmRoot"/>
+      </p:par>
+    </p:tnLst>
+  </p:timing>
+</p:sld>
+</file>
+
+<file path=ppt/slides/slide15.xml><?xml version="1.0" encoding="utf-8"?>
+<p:sld xmlns:a="http://schemas.openxmlformats.org/drawingml/2006/main" xmlns:r="http://schemas.openxmlformats.org/officeDocument/2006/relationships" xmlns:p="http://schemas.openxmlformats.org/presentationml/2006/main">
+  <p:cSld>
+    <p:spTree>
+      <p:nvGrpSpPr>
+        <p:cNvPr id="1" name=""/>
+        <p:cNvGrpSpPr/>
+        <p:nvPr/>
+      </p:nvGrpSpPr>
+      <p:grpSpPr>
+        <a:xfrm>
+          <a:off x="0" y="0"/>
+          <a:ext cx="0" cy="0"/>
+          <a:chOff x="0" y="0"/>
+          <a:chExt cx="0" cy="0"/>
+        </a:xfrm>
+      </p:grpSpPr>
+      <p:sp>
+        <p:nvSpPr>
+          <p:cNvPr id="2" name="Title 1"/>
+          <p:cNvSpPr>
+            <a:spLocks noGrp="1"/>
+          </p:cNvSpPr>
+          <p:nvPr>
+            <p:ph type="title"/>
+          </p:nvPr>
+        </p:nvSpPr>
+        <p:spPr>
+          <a:xfrm>
+            <a:off x="1141413" y="1041991"/>
+            <a:ext cx="9905998" cy="1049079"/>
+          </a:xfrm>
+        </p:spPr>
+        <p:txBody>
+          <a:bodyPr/>
+          <a:lstStyle/>
+          <a:p>
+            <a:r>
+              <a:rPr lang="en-US" dirty="0"/>
+              <a:t>X-means</a:t>
+            </a:r>
+          </a:p>
+        </p:txBody>
+      </p:sp>
+      <p:sp>
+        <p:nvSpPr>
+          <p:cNvPr id="3" name="Content Placeholder 2"/>
+          <p:cNvSpPr>
+            <a:spLocks noGrp="1"/>
+          </p:cNvSpPr>
+          <p:nvPr>
+            <p:ph idx="1"/>
+          </p:nvPr>
+        </p:nvSpPr>
+        <p:spPr>
+          <a:xfrm>
+            <a:off x="1141413" y="2197395"/>
+            <a:ext cx="9905998" cy="3593805"/>
+          </a:xfrm>
+        </p:spPr>
+        <p:txBody>
+          <a:bodyPr/>
+          <a:lstStyle/>
+          <a:p>
+            <a:r>
+              <a:rPr lang="en-US" dirty="0"/>
+              <a:t>Parameters</a:t>
+            </a:r>
+          </a:p>
+          <a:p>
+            <a:endParaRPr lang="en-US" dirty="0"/>
+          </a:p>
+          <a:p>
+            <a:pPr lvl="1"/>
+            <a:r>
+              <a:rPr lang="en-US" dirty="0"/>
+              <a:t>Dataset </a:t>
+            </a:r>
+          </a:p>
+          <a:p>
+            <a:pPr lvl="1"/>
+            <a:endParaRPr lang="en-US" dirty="0"/>
+          </a:p>
+          <a:p>
+            <a:pPr lvl="1"/>
+            <a:r>
+              <a:rPr lang="en-US" dirty="0"/>
+              <a:t>Range true K is in</a:t>
+            </a:r>
+          </a:p>
+          <a:p>
+            <a:pPr lvl="1"/>
+            <a:endParaRPr lang="en-US" dirty="0"/>
+          </a:p>
+          <a:p>
+            <a:pPr lvl="1"/>
+            <a:r>
+              <a:rPr lang="en-US" dirty="0"/>
+              <a:t>Max number of K mean loops, optional </a:t>
+            </a:r>
+          </a:p>
+        </p:txBody>
+      </p:sp>
+    </p:spTree>
+    <p:extLst>
+      <p:ext uri="{BB962C8B-B14F-4D97-AF65-F5344CB8AC3E}">
+        <p14:creationId xmlns:p14="http://schemas.microsoft.com/office/powerpoint/2010/main" val="831948700"/>
+      </p:ext>
+    </p:extLst>
+  </p:cSld>
+  <p:clrMapOvr>
+    <a:masterClrMapping/>
+  </p:clrMapOvr>
+  <p:timing>
+    <p:tnLst>
+      <p:par>
+        <p:cTn id="1" dur="indefinite" restart="never" nodeType="tmRoot"/>
+      </p:par>
+    </p:tnLst>
+  </p:timing>
+</p:sld>
+</file>
+
+<file path=ppt/slides/slide16.xml><?xml version="1.0" encoding="utf-8"?>
+<p:sld xmlns:a="http://schemas.openxmlformats.org/drawingml/2006/main" xmlns:r="http://schemas.openxmlformats.org/officeDocument/2006/relationships" xmlns:p="http://schemas.openxmlformats.org/presentationml/2006/main">
+  <p:cSld>
+    <p:spTree>
+      <p:nvGrpSpPr>
+        <p:cNvPr id="1" name=""/>
+        <p:cNvGrpSpPr/>
+        <p:nvPr/>
+      </p:nvGrpSpPr>
+      <p:grpSpPr>
+        <a:xfrm>
+          <a:off x="0" y="0"/>
+          <a:ext cx="0" cy="0"/>
+          <a:chOff x="0" y="0"/>
+          <a:chExt cx="0" cy="0"/>
+        </a:xfrm>
+      </p:grpSpPr>
+      <p:sp>
+        <p:nvSpPr>
+          <p:cNvPr id="2" name="Title 1"/>
+          <p:cNvSpPr>
+            <a:spLocks noGrp="1"/>
+          </p:cNvSpPr>
+          <p:nvPr>
+            <p:ph type="title"/>
+          </p:nvPr>
+        </p:nvSpPr>
+        <p:spPr>
+          <a:xfrm>
+            <a:off x="1141413" y="1041991"/>
+            <a:ext cx="9905998" cy="1049079"/>
+          </a:xfrm>
+        </p:spPr>
+        <p:txBody>
+          <a:bodyPr/>
+          <a:lstStyle/>
+          <a:p>
+            <a:r>
+              <a:rPr lang="en-US" dirty="0"/>
+              <a:t>What X-means Does</a:t>
+            </a:r>
+          </a:p>
+        </p:txBody>
+      </p:sp>
+      <p:sp>
+        <p:nvSpPr>
+          <p:cNvPr id="3" name="Content Placeholder 2"/>
+          <p:cNvSpPr>
+            <a:spLocks noGrp="1"/>
+          </p:cNvSpPr>
+          <p:nvPr>
+            <p:ph idx="1"/>
+          </p:nvPr>
+        </p:nvSpPr>
+        <p:spPr>
+          <a:xfrm>
+            <a:off x="1141413" y="2197395"/>
+            <a:ext cx="9905998" cy="3593805"/>
+          </a:xfrm>
+        </p:spPr>
+        <p:txBody>
+          <a:bodyPr/>
+          <a:lstStyle/>
+          <a:p>
+            <a:r>
+              <a:rPr lang="en-US" dirty="0"/>
+              <a:t>Improves on K-Means by letting K be a range of numbers </a:t>
+            </a:r>
+          </a:p>
+          <a:p>
+            <a:r>
+              <a:rPr lang="en-US" dirty="0"/>
+              <a:t> Helps the problem of finding only the local minima </a:t>
+            </a:r>
+          </a:p>
+          <a:p>
+            <a:r>
+              <a:rPr lang="en-US" dirty="0"/>
+              <a:t>Can be sped up using K-D trees</a:t>
+            </a:r>
+          </a:p>
+        </p:txBody>
+      </p:sp>
+    </p:spTree>
+    <p:extLst>
+      <p:ext uri="{BB962C8B-B14F-4D97-AF65-F5344CB8AC3E}">
+        <p14:creationId xmlns:p14="http://schemas.microsoft.com/office/powerpoint/2010/main" val="3217976806"/>
+      </p:ext>
+    </p:extLst>
+  </p:cSld>
+  <p:clrMapOvr>
+    <a:masterClrMapping/>
+  </p:clrMapOvr>
+  <p:timing>
+    <p:tnLst>
+      <p:par>
+        <p:cTn id="1" dur="indefinite" restart="never" nodeType="tmRoot"/>
+      </p:par>
+    </p:tnLst>
+  </p:timing>
+</p:sld>
+</file>
+
+<file path=ppt/slides/slide17.xml><?xml version="1.0" encoding="utf-8"?>
+<p:sld xmlns:a="http://schemas.openxmlformats.org/drawingml/2006/main" xmlns:r="http://schemas.openxmlformats.org/officeDocument/2006/relationships" xmlns:p="http://schemas.openxmlformats.org/presentationml/2006/main">
+  <p:cSld>
+    <p:spTree>
+      <p:nvGrpSpPr>
+        <p:cNvPr id="1" name=""/>
+        <p:cNvGrpSpPr/>
+        <p:nvPr/>
+      </p:nvGrpSpPr>
+      <p:grpSpPr>
+        <a:xfrm>
+          <a:off x="0" y="0"/>
+          <a:ext cx="0" cy="0"/>
+          <a:chOff x="0" y="0"/>
+          <a:chExt cx="0" cy="0"/>
+        </a:xfrm>
+      </p:grpSpPr>
+      <p:sp>
+        <p:nvSpPr>
+          <p:cNvPr id="2" name="Title 1"/>
+          <p:cNvSpPr>
+            <a:spLocks noGrp="1"/>
+          </p:cNvSpPr>
+          <p:nvPr>
+            <p:ph type="title"/>
+          </p:nvPr>
+        </p:nvSpPr>
+        <p:spPr>
+          <a:xfrm>
+            <a:off x="1141413" y="135980"/>
+            <a:ext cx="9905998" cy="1049079"/>
+          </a:xfrm>
+        </p:spPr>
+        <p:txBody>
+          <a:bodyPr/>
+          <a:lstStyle/>
+          <a:p>
+            <a:r>
+              <a:rPr lang="en-US" dirty="0"/>
+              <a:t>What X-means Does</a:t>
+            </a:r>
+          </a:p>
+        </p:txBody>
+      </p:sp>
+      <p:pic>
+        <p:nvPicPr>
+          <p:cNvPr id="4" name="Content Placeholder 3"/>
+          <p:cNvPicPr>
+            <a:picLocks noGrp="1" noChangeAspect="1"/>
+          </p:cNvPicPr>
+          <p:nvPr>
+            <p:ph idx="1"/>
+          </p:nvPr>
+        </p:nvPicPr>
+        <p:blipFill>
+          <a:blip r:embed="rId2"/>
+          <a:stretch>
+            <a:fillRect/>
+          </a:stretch>
+        </p:blipFill>
+        <p:spPr>
+          <a:xfrm>
+            <a:off x="86114" y="980696"/>
+            <a:ext cx="7858260" cy="5902127"/>
+          </a:xfrm>
+        </p:spPr>
+      </p:pic>
+    </p:spTree>
+    <p:extLst>
+      <p:ext uri="{BB962C8B-B14F-4D97-AF65-F5344CB8AC3E}">
+        <p14:creationId xmlns:p14="http://schemas.microsoft.com/office/powerpoint/2010/main" val="552237662"/>
+      </p:ext>
+    </p:extLst>
+  </p:cSld>
+  <p:clrMapOvr>
+    <a:masterClrMapping/>
+  </p:clrMapOvr>
+</p:sld>
+</file>
+
+<file path=ppt/slides/slide18.xml><?xml version="1.0" encoding="utf-8"?>
+<p:sld xmlns:a="http://schemas.openxmlformats.org/drawingml/2006/main" xmlns:r="http://schemas.openxmlformats.org/officeDocument/2006/relationships" xmlns:p="http://schemas.openxmlformats.org/presentationml/2006/main">
+  <p:cSld>
+    <p:spTree>
+      <p:nvGrpSpPr>
+        <p:cNvPr id="1" name=""/>
+        <p:cNvGrpSpPr/>
+        <p:nvPr/>
+      </p:nvGrpSpPr>
+      <p:grpSpPr>
+        <a:xfrm>
+          <a:off x="0" y="0"/>
+          <a:ext cx="0" cy="0"/>
+          <a:chOff x="0" y="0"/>
+          <a:chExt cx="0" cy="0"/>
+        </a:xfrm>
+      </p:grpSpPr>
+      <p:sp>
+        <p:nvSpPr>
+          <p:cNvPr id="2" name="Title 1"/>
+          <p:cNvSpPr>
+            <a:spLocks noGrp="1"/>
+          </p:cNvSpPr>
+          <p:nvPr>
+            <p:ph type="title"/>
+          </p:nvPr>
+        </p:nvSpPr>
+        <p:spPr>
+          <a:xfrm>
             <a:off x="621295" y="278593"/>
             <a:ext cx="9905998" cy="1049079"/>
           </a:xfrm>
@@ -5941,7 +6917,7 @@
 </p:sld>
 </file>
 
-<file path=ppt/slides/slide12.xml><?xml version="1.0" encoding="utf-8"?>
+<file path=ppt/slides/slide19.xml><?xml version="1.0" encoding="utf-8"?>
 <p:sld xmlns:a="http://schemas.openxmlformats.org/drawingml/2006/main" xmlns:r="http://schemas.openxmlformats.org/officeDocument/2006/relationships" xmlns:p="http://schemas.openxmlformats.org/presentationml/2006/main">
   <p:cSld>
     <p:spTree>
@@ -6026,7 +7002,116 @@
 </p:sld>
 </file>
 
-<file path=ppt/slides/slide13.xml><?xml version="1.0" encoding="utf-8"?>
+<file path=ppt/slides/slide2.xml><?xml version="1.0" encoding="utf-8"?>
+<p:sld xmlns:a="http://schemas.openxmlformats.org/drawingml/2006/main" xmlns:r="http://schemas.openxmlformats.org/officeDocument/2006/relationships" xmlns:p="http://schemas.openxmlformats.org/presentationml/2006/main">
+  <p:cSld>
+    <p:spTree>
+      <p:nvGrpSpPr>
+        <p:cNvPr id="1" name=""/>
+        <p:cNvGrpSpPr/>
+        <p:nvPr/>
+      </p:nvGrpSpPr>
+      <p:grpSpPr>
+        <a:xfrm>
+          <a:off x="0" y="0"/>
+          <a:ext cx="0" cy="0"/>
+          <a:chOff x="0" y="0"/>
+          <a:chExt cx="0" cy="0"/>
+        </a:xfrm>
+      </p:grpSpPr>
+      <p:sp>
+        <p:nvSpPr>
+          <p:cNvPr id="2" name="Title 1"/>
+          <p:cNvSpPr>
+            <a:spLocks noGrp="1"/>
+          </p:cNvSpPr>
+          <p:nvPr>
+            <p:ph type="title"/>
+          </p:nvPr>
+        </p:nvSpPr>
+        <p:spPr>
+          <a:xfrm>
+            <a:off x="1141413" y="999460"/>
+            <a:ext cx="9905998" cy="1148316"/>
+          </a:xfrm>
+        </p:spPr>
+        <p:txBody>
+          <a:bodyPr/>
+          <a:lstStyle/>
+          <a:p>
+            <a:r>
+              <a:rPr lang="en-US" dirty="0"/>
+              <a:t>Algorithms Implemented</a:t>
+            </a:r>
+          </a:p>
+        </p:txBody>
+      </p:sp>
+      <p:sp>
+        <p:nvSpPr>
+          <p:cNvPr id="3" name="Content Placeholder 2"/>
+          <p:cNvSpPr>
+            <a:spLocks noGrp="1"/>
+          </p:cNvSpPr>
+          <p:nvPr>
+            <p:ph idx="1"/>
+          </p:nvPr>
+        </p:nvSpPr>
+        <p:spPr>
+          <a:xfrm>
+            <a:off x="1141413" y="2147777"/>
+            <a:ext cx="9905998" cy="3281916"/>
+          </a:xfrm>
+        </p:spPr>
+        <p:txBody>
+          <a:bodyPr/>
+          <a:lstStyle/>
+          <a:p>
+            <a:r>
+              <a:rPr lang="en-US" dirty="0"/>
+              <a:t>Apriori – Frequent Itemset Mining</a:t>
+            </a:r>
+          </a:p>
+          <a:p>
+            <a:endParaRPr lang="en-US" dirty="0"/>
+          </a:p>
+          <a:p>
+            <a:r>
+              <a:rPr lang="en-US" dirty="0"/>
+              <a:t>ID3 – Classification</a:t>
+            </a:r>
+          </a:p>
+          <a:p>
+            <a:endParaRPr lang="en-US" dirty="0"/>
+          </a:p>
+          <a:p>
+            <a:r>
+              <a:rPr lang="en-US" dirty="0"/>
+              <a:t>X-means - Clustering</a:t>
+            </a:r>
+          </a:p>
+        </p:txBody>
+      </p:sp>
+    </p:spTree>
+    <p:extLst>
+      <p:ext uri="{BB962C8B-B14F-4D97-AF65-F5344CB8AC3E}">
+        <p14:creationId xmlns:p14="http://schemas.microsoft.com/office/powerpoint/2010/main" val="1633808456"/>
+      </p:ext>
+    </p:extLst>
+  </p:cSld>
+  <p:clrMapOvr>
+    <a:masterClrMapping/>
+  </p:clrMapOvr>
+  <p:timing>
+    <p:tnLst>
+      <p:par>
+        <p:cTn id="1" dur="indefinite" restart="never" nodeType="tmRoot"/>
+      </p:par>
+    </p:tnLst>
+  </p:timing>
+</p:sld>
+</file>
+
+<file path=ppt/slides/slide20.xml><?xml version="1.0" encoding="utf-8"?>
 <p:sld xmlns:a="http://schemas.openxmlformats.org/drawingml/2006/main" xmlns:r="http://schemas.openxmlformats.org/officeDocument/2006/relationships" xmlns:p="http://schemas.openxmlformats.org/presentationml/2006/main">
   <p:cSld>
     <p:spTree>
@@ -6111,7 +7196,7 @@
 </p:sld>
 </file>
 
-<file path=ppt/slides/slide14.xml><?xml version="1.0" encoding="utf-8"?>
+<file path=ppt/slides/slide21.xml><?xml version="1.0" encoding="utf-8"?>
 <p:sld xmlns:a="http://schemas.openxmlformats.org/drawingml/2006/main" xmlns:r="http://schemas.openxmlformats.org/officeDocument/2006/relationships" xmlns:p="http://schemas.openxmlformats.org/presentationml/2006/main">
   <p:cSld>
     <p:spTree>
@@ -6349,7 +7434,7 @@
 </p:sld>
 </file>
 
-<file path=ppt/slides/slide15.xml><?xml version="1.0" encoding="utf-8"?>
+<file path=ppt/slides/slide22.xml><?xml version="1.0" encoding="utf-8"?>
 <p:sld xmlns:a="http://schemas.openxmlformats.org/drawingml/2006/main" xmlns:r="http://schemas.openxmlformats.org/officeDocument/2006/relationships" xmlns:p="http://schemas.openxmlformats.org/presentationml/2006/main">
   <p:cSld>
     <p:spTree>
@@ -6445,7 +7530,7 @@
 </p:sld>
 </file>
 
-<file path=ppt/slides/slide16.xml><?xml version="1.0" encoding="utf-8"?>
+<file path=ppt/slides/slide23.xml><?xml version="1.0" encoding="utf-8"?>
 <p:sld xmlns:a="http://schemas.openxmlformats.org/drawingml/2006/main" xmlns:r="http://schemas.openxmlformats.org/officeDocument/2006/relationships" xmlns:p="http://schemas.openxmlformats.org/presentationml/2006/main">
   <p:cSld>
     <p:spTree>
@@ -6523,108 +7608,6 @@
     <p:extLst>
       <p:ext uri="{BB962C8B-B14F-4D97-AF65-F5344CB8AC3E}">
         <p14:creationId xmlns:p14="http://schemas.microsoft.com/office/powerpoint/2010/main" val="3708619962"/>
-      </p:ext>
-    </p:extLst>
-  </p:cSld>
-  <p:clrMapOvr>
-    <a:masterClrMapping/>
-  </p:clrMapOvr>
-</p:sld>
-</file>
-
-<file path=ppt/slides/slide2.xml><?xml version="1.0" encoding="utf-8"?>
-<p:sld xmlns:a="http://schemas.openxmlformats.org/drawingml/2006/main" xmlns:r="http://schemas.openxmlformats.org/officeDocument/2006/relationships" xmlns:p="http://schemas.openxmlformats.org/presentationml/2006/main">
-  <p:cSld>
-    <p:spTree>
-      <p:nvGrpSpPr>
-        <p:cNvPr id="1" name=""/>
-        <p:cNvGrpSpPr/>
-        <p:nvPr/>
-      </p:nvGrpSpPr>
-      <p:grpSpPr>
-        <a:xfrm>
-          <a:off x="0" y="0"/>
-          <a:ext cx="0" cy="0"/>
-          <a:chOff x="0" y="0"/>
-          <a:chExt cx="0" cy="0"/>
-        </a:xfrm>
-      </p:grpSpPr>
-      <p:sp>
-        <p:nvSpPr>
-          <p:cNvPr id="2" name="Title 1"/>
-          <p:cNvSpPr>
-            <a:spLocks noGrp="1"/>
-          </p:cNvSpPr>
-          <p:nvPr>
-            <p:ph type="title"/>
-          </p:nvPr>
-        </p:nvSpPr>
-        <p:spPr>
-          <a:xfrm>
-            <a:off x="1141413" y="999460"/>
-            <a:ext cx="9905998" cy="1148316"/>
-          </a:xfrm>
-        </p:spPr>
-        <p:txBody>
-          <a:bodyPr/>
-          <a:lstStyle/>
-          <a:p>
-            <a:r>
-              <a:rPr lang="en-US" dirty="0"/>
-              <a:t>Algorithms Implemented</a:t>
-            </a:r>
-          </a:p>
-        </p:txBody>
-      </p:sp>
-      <p:sp>
-        <p:nvSpPr>
-          <p:cNvPr id="3" name="Content Placeholder 2"/>
-          <p:cNvSpPr>
-            <a:spLocks noGrp="1"/>
-          </p:cNvSpPr>
-          <p:nvPr>
-            <p:ph idx="1"/>
-          </p:nvPr>
-        </p:nvSpPr>
-        <p:spPr>
-          <a:xfrm>
-            <a:off x="1141413" y="2147777"/>
-            <a:ext cx="9905998" cy="3281916"/>
-          </a:xfrm>
-        </p:spPr>
-        <p:txBody>
-          <a:bodyPr/>
-          <a:lstStyle/>
-          <a:p>
-            <a:r>
-              <a:rPr lang="en-US" dirty="0"/>
-              <a:t>Apriori – Frequent Itemset Mining</a:t>
-            </a:r>
-          </a:p>
-          <a:p>
-            <a:endParaRPr lang="en-US" dirty="0"/>
-          </a:p>
-          <a:p>
-            <a:r>
-              <a:rPr lang="en-US" dirty="0"/>
-              <a:t>ID3 – Classification</a:t>
-            </a:r>
-          </a:p>
-          <a:p>
-            <a:endParaRPr lang="en-US" dirty="0"/>
-          </a:p>
-          <a:p>
-            <a:r>
-              <a:rPr lang="en-US" dirty="0"/>
-              <a:t>X-means - Clustering</a:t>
-            </a:r>
-          </a:p>
-        </p:txBody>
-      </p:sp>
-    </p:spTree>
-    <p:extLst>
-      <p:ext uri="{BB962C8B-B14F-4D97-AF65-F5344CB8AC3E}">
-        <p14:creationId xmlns:p14="http://schemas.microsoft.com/office/powerpoint/2010/main" val="1633808456"/>
       </p:ext>
     </p:extLst>
   </p:cSld>
@@ -6747,6 +7730,13 @@
   <p:clrMapOvr>
     <a:masterClrMapping/>
   </p:clrMapOvr>
+  <p:timing>
+    <p:tnLst>
+      <p:par>
+        <p:cTn id="1" dur="indefinite" restart="never" nodeType="tmRoot"/>
+      </p:par>
+    </p:tnLst>
+  </p:timing>
 </p:sld>
 </file>
 
@@ -6860,6 +7850,13 @@
   <p:clrMapOvr>
     <a:masterClrMapping/>
   </p:clrMapOvr>
+  <p:timing>
+    <p:tnLst>
+      <p:par>
+        <p:cTn id="1" dur="indefinite" restart="never" nodeType="tmRoot"/>
+      </p:par>
+    </p:tnLst>
+  </p:timing>
 </p:sld>
 </file>
 
@@ -6892,32 +7889,35 @@
         </p:nvSpPr>
         <p:spPr>
           <a:xfrm>
-            <a:off x="1141411" y="1600200"/>
-            <a:ext cx="3549121" cy="512135"/>
-          </a:xfrm>
-        </p:spPr>
-        <p:txBody>
-          <a:bodyPr/>
-          <a:lstStyle/>
-          <a:p>
-            <a:r>
-              <a:rPr lang="en-US" dirty="0"/>
-              <a:t>Apriori Output</a:t>
-            </a:r>
+            <a:off x="0" y="123341"/>
+            <a:ext cx="2417486" cy="982445"/>
+          </a:xfrm>
+        </p:spPr>
+        <p:txBody>
+          <a:bodyPr>
+            <a:normAutofit/>
+          </a:bodyPr>
+          <a:lstStyle/>
+          <a:p>
+            <a:r>
+              <a:rPr lang="en-US" dirty="0" smtClean="0"/>
+              <a:t>Apriori Algorithm</a:t>
+            </a:r>
+            <a:endParaRPr lang="en-US" dirty="0"/>
           </a:p>
         </p:txBody>
       </p:sp>
       <p:pic>
         <p:nvPicPr>
-          <p:cNvPr id="4" name="Content Placeholder 3"/>
+          <p:cNvPr id="7" name="Picture Placeholder 6"/>
           <p:cNvPicPr>
             <a:picLocks noGrp="1" noChangeAspect="1"/>
           </p:cNvPicPr>
           <p:nvPr>
-            <p:ph idx="1"/>
+            <p:ph type="pic" idx="1"/>
           </p:nvPr>
         </p:nvPicPr>
-        <p:blipFill>
+        <p:blipFill rotWithShape="1">
           <a:blip r:embed="rId2">
             <a:extLst>
               <a:ext uri="{28A0092B-C50C-407E-A947-70E740481C1C}">
@@ -6925,81 +7925,33 @@
               </a:ext>
             </a:extLst>
           </a:blip>
-          <a:stretch>
-            <a:fillRect/>
-          </a:stretch>
+          <a:srcRect l="1428" t="662" r="4894" b="4699"/>
+          <a:stretch/>
         </p:blipFill>
         <p:spPr>
           <a:xfrm>
-            <a:off x="5103813" y="708187"/>
-            <a:ext cx="5943600" cy="4984425"/>
+            <a:off x="2417486" y="0"/>
+            <a:ext cx="9774514" cy="6858000"/>
           </a:xfrm>
         </p:spPr>
       </p:pic>
-      <p:sp>
-        <p:nvSpPr>
-          <p:cNvPr id="6" name="Text Placeholder 5"/>
-          <p:cNvSpPr>
-            <a:spLocks noGrp="1"/>
-          </p:cNvSpPr>
-          <p:nvPr>
-            <p:ph type="body" sz="half" idx="2"/>
-          </p:nvPr>
-        </p:nvSpPr>
-        <p:spPr>
-          <a:xfrm>
-            <a:off x="1141411" y="2317898"/>
-            <a:ext cx="3549121" cy="2977116"/>
-          </a:xfrm>
-        </p:spPr>
-        <p:txBody>
-          <a:bodyPr/>
-          <a:lstStyle/>
-          <a:p>
-            <a:r>
-              <a:rPr lang="en-US" dirty="0"/>
-              <a:t>Input: Belgium retail market</a:t>
-            </a:r>
-          </a:p>
-          <a:p>
-            <a:endParaRPr lang="en-US" dirty="0"/>
-          </a:p>
-          <a:p>
-            <a:r>
-              <a:rPr lang="en-US" dirty="0"/>
-              <a:t>Min Sup: 1500</a:t>
-            </a:r>
-          </a:p>
-          <a:p>
-            <a:endParaRPr lang="en-US" dirty="0"/>
-          </a:p>
-          <a:p>
-            <a:r>
-              <a:rPr lang="en-US" dirty="0"/>
-              <a:t>Children: 5</a:t>
-            </a:r>
-          </a:p>
-          <a:p>
-            <a:endParaRPr lang="en-US" dirty="0"/>
-          </a:p>
-          <a:p>
-            <a:r>
-              <a:rPr lang="en-US" dirty="0"/>
-              <a:t>Bucket Size: 3</a:t>
-            </a:r>
-          </a:p>
-        </p:txBody>
-      </p:sp>
     </p:spTree>
     <p:extLst>
       <p:ext uri="{BB962C8B-B14F-4D97-AF65-F5344CB8AC3E}">
-        <p14:creationId xmlns:p14="http://schemas.microsoft.com/office/powerpoint/2010/main" val="653915034"/>
+        <p14:creationId xmlns:p14="http://schemas.microsoft.com/office/powerpoint/2010/main" val="938942719"/>
       </p:ext>
     </p:extLst>
   </p:cSld>
   <p:clrMapOvr>
     <a:masterClrMapping/>
   </p:clrMapOvr>
+  <p:timing>
+    <p:tnLst>
+      <p:par>
+        <p:cTn id="1" dur="indefinite" restart="never" nodeType="tmRoot"/>
+      </p:par>
+    </p:tnLst>
+  </p:timing>
 </p:sld>
 </file>
 
@@ -7032,102 +7984,100 @@
         </p:nvSpPr>
         <p:spPr>
           <a:xfrm>
-            <a:off x="1141413" y="1041991"/>
-            <a:ext cx="9905998" cy="1049079"/>
-          </a:xfrm>
-        </p:spPr>
-        <p:txBody>
-          <a:bodyPr/>
-          <a:lstStyle/>
-          <a:p>
-            <a:r>
-              <a:rPr lang="en-US" dirty="0"/>
-              <a:t>ID3</a:t>
-            </a:r>
-          </a:p>
-        </p:txBody>
-      </p:sp>
-      <p:sp>
-        <p:nvSpPr>
-          <p:cNvPr id="3" name="Content Placeholder 2"/>
-          <p:cNvSpPr>
-            <a:spLocks noGrp="1"/>
-          </p:cNvSpPr>
-          <p:nvPr>
-            <p:ph idx="1"/>
-          </p:nvPr>
-        </p:nvSpPr>
-        <p:spPr>
-          <a:xfrm>
-            <a:off x="1141413" y="2197395"/>
-            <a:ext cx="9905998" cy="3593805"/>
-          </a:xfrm>
-        </p:spPr>
-        <p:txBody>
-          <a:bodyPr/>
-          <a:lstStyle/>
-          <a:p>
-            <a:r>
-              <a:rPr lang="en-US" dirty="0"/>
-              <a:t>Parameters</a:t>
-            </a:r>
-          </a:p>
-          <a:p>
-            <a:endParaRPr lang="en-US" dirty="0"/>
-          </a:p>
-          <a:p>
-            <a:pPr lvl="1"/>
-            <a:r>
-              <a:rPr lang="en-US" dirty="0" err="1"/>
-              <a:t>Param</a:t>
-            </a:r>
-            <a:r>
-              <a:rPr lang="en-US" dirty="0"/>
-              <a:t> 1 (required)</a:t>
-            </a:r>
-          </a:p>
-          <a:p>
-            <a:pPr lvl="1"/>
-            <a:endParaRPr lang="en-US" dirty="0"/>
-          </a:p>
-          <a:p>
-            <a:pPr lvl="1"/>
-            <a:r>
-              <a:rPr lang="en-US" dirty="0" err="1"/>
-              <a:t>Param</a:t>
-            </a:r>
-            <a:r>
-              <a:rPr lang="en-US" dirty="0"/>
-              <a:t> 2</a:t>
-            </a:r>
-          </a:p>
-          <a:p>
-            <a:pPr lvl="1"/>
-            <a:endParaRPr lang="en-US" dirty="0"/>
-          </a:p>
-          <a:p>
-            <a:pPr lvl="1"/>
-            <a:r>
-              <a:rPr lang="en-US" dirty="0" err="1"/>
-              <a:t>Param</a:t>
-            </a:r>
-            <a:r>
-              <a:rPr lang="en-US" dirty="0"/>
-              <a:t> 3</a:t>
-            </a:r>
-          </a:p>
-        </p:txBody>
-      </p:sp>
+            <a:off x="488272" y="748029"/>
+            <a:ext cx="2417486" cy="982445"/>
+          </a:xfrm>
+        </p:spPr>
+        <p:txBody>
+          <a:bodyPr>
+            <a:normAutofit/>
+          </a:bodyPr>
+          <a:lstStyle/>
+          <a:p>
+            <a:pPr algn="ctr"/>
+            <a:r>
+              <a:rPr lang="en-US" dirty="0" smtClean="0"/>
+              <a:t>Apriori: Node Add</a:t>
+            </a:r>
+            <a:endParaRPr lang="en-US" dirty="0"/>
+          </a:p>
+        </p:txBody>
+      </p:sp>
+      <p:pic>
+        <p:nvPicPr>
+          <p:cNvPr id="7" name="Picture Placeholder 6"/>
+          <p:cNvPicPr>
+            <a:picLocks noGrp="1" noChangeAspect="1"/>
+          </p:cNvPicPr>
+          <p:nvPr>
+            <p:ph type="pic" idx="1"/>
+          </p:nvPr>
+        </p:nvPicPr>
+        <p:blipFill rotWithShape="1">
+          <a:blip r:embed="rId2">
+            <a:extLst>
+              <a:ext uri="{28A0092B-C50C-407E-A947-70E740481C1C}">
+                <a14:useLocalDpi xmlns:a14="http://schemas.microsoft.com/office/drawing/2010/main" val="0"/>
+              </a:ext>
+            </a:extLst>
+          </a:blip>
+          <a:srcRect r="42902" b="3471"/>
+          <a:stretch/>
+        </p:blipFill>
+        <p:spPr>
+          <a:xfrm>
+            <a:off x="3231472" y="0"/>
+            <a:ext cx="8960528" cy="6870510"/>
+          </a:xfrm>
+        </p:spPr>
+      </p:pic>
+      <p:pic>
+        <p:nvPicPr>
+          <p:cNvPr id="3" name="Picture 2"/>
+          <p:cNvPicPr>
+            <a:picLocks noChangeAspect="1"/>
+          </p:cNvPicPr>
+          <p:nvPr/>
+        </p:nvPicPr>
+        <p:blipFill>
+          <a:blip r:embed="rId3">
+            <a:extLst>
+              <a:ext uri="{28A0092B-C50C-407E-A947-70E740481C1C}">
+                <a14:useLocalDpi xmlns:a14="http://schemas.microsoft.com/office/drawing/2010/main" val="0"/>
+              </a:ext>
+            </a:extLst>
+          </a:blip>
+          <a:stretch>
+            <a:fillRect/>
+          </a:stretch>
+        </p:blipFill>
+        <p:spPr>
+          <a:xfrm>
+            <a:off x="29181" y="2478503"/>
+            <a:ext cx="3202291" cy="2102374"/>
+          </a:xfrm>
+          <a:prstGeom prst="rect">
+            <a:avLst/>
+          </a:prstGeom>
+        </p:spPr>
+      </p:pic>
     </p:spTree>
     <p:extLst>
       <p:ext uri="{BB962C8B-B14F-4D97-AF65-F5344CB8AC3E}">
-        <p14:creationId xmlns:p14="http://schemas.microsoft.com/office/powerpoint/2010/main" val="4019156827"/>
+        <p14:creationId xmlns:p14="http://schemas.microsoft.com/office/powerpoint/2010/main" val="2457480273"/>
       </p:ext>
     </p:extLst>
   </p:cSld>
   <p:clrMapOvr>
     <a:masterClrMapping/>
   </p:clrMapOvr>
+  <p:timing>
+    <p:tnLst>
+      <p:par>
+        <p:cTn id="1" dur="indefinite" restart="never" nodeType="tmRoot"/>
+      </p:par>
+    </p:tnLst>
+  </p:timing>
 </p:sld>
 </file>
 
@@ -7170,7 +8120,7 @@
           <a:p>
             <a:r>
               <a:rPr lang="en-US" dirty="0"/>
-              <a:t>ID3 Output</a:t>
+              <a:t>Apriori Output</a:t>
             </a:r>
           </a:p>
         </p:txBody>
@@ -7199,8 +8149,8 @@
         </p:blipFill>
         <p:spPr>
           <a:xfrm>
-            <a:off x="5103813" y="708187"/>
-            <a:ext cx="5943600" cy="4984425"/>
+            <a:off x="5103812" y="708187"/>
+            <a:ext cx="6924921" cy="5807381"/>
           </a:xfrm>
         </p:spPr>
       </p:pic>
@@ -7226,7 +8176,7 @@
           <a:p>
             <a:r>
               <a:rPr lang="en-US" dirty="0"/>
-              <a:t>Input: Some Input</a:t>
+              <a:t>Input: Belgium retail market</a:t>
             </a:r>
           </a:p>
           <a:p>
@@ -7235,7 +8185,7 @@
           <a:p>
             <a:r>
               <a:rPr lang="en-US" dirty="0"/>
-              <a:t>Parameters</a:t>
+              <a:t>Min Sup: 1500</a:t>
             </a:r>
           </a:p>
           <a:p>
@@ -7244,7 +8194,7 @@
           <a:p>
             <a:r>
               <a:rPr lang="en-US" dirty="0"/>
-              <a:t>Other Info</a:t>
+              <a:t>Children: 5</a:t>
             </a:r>
           </a:p>
           <a:p>
@@ -7253,21 +8203,58 @@
           <a:p>
             <a:r>
               <a:rPr lang="en-US" dirty="0"/>
-              <a:t>Whatever</a:t>
-            </a:r>
-          </a:p>
-        </p:txBody>
-      </p:sp>
+              <a:t>Bucket Size: 3</a:t>
+            </a:r>
+          </a:p>
+        </p:txBody>
+      </p:sp>
+      <p:pic>
+        <p:nvPicPr>
+          <p:cNvPr id="3" name="Picture 2"/>
+          <p:cNvPicPr>
+            <a:picLocks noChangeAspect="1"/>
+          </p:cNvPicPr>
+          <p:nvPr/>
+        </p:nvPicPr>
+        <p:blipFill>
+          <a:blip r:embed="rId3">
+            <a:extLst>
+              <a:ext uri="{28A0092B-C50C-407E-A947-70E740481C1C}">
+                <a14:useLocalDpi xmlns:a14="http://schemas.microsoft.com/office/drawing/2010/main" val="0"/>
+              </a:ext>
+            </a:extLst>
+          </a:blip>
+          <a:stretch>
+            <a:fillRect/>
+          </a:stretch>
+        </p:blipFill>
+        <p:spPr>
+          <a:xfrm>
+            <a:off x="92243" y="90984"/>
+            <a:ext cx="11936491" cy="514422"/>
+          </a:xfrm>
+          <a:prstGeom prst="rect">
+            <a:avLst/>
+          </a:prstGeom>
+        </p:spPr>
+      </p:pic>
     </p:spTree>
     <p:extLst>
       <p:ext uri="{BB962C8B-B14F-4D97-AF65-F5344CB8AC3E}">
-        <p14:creationId xmlns:p14="http://schemas.microsoft.com/office/powerpoint/2010/main" val="2396371313"/>
+        <p14:creationId xmlns:p14="http://schemas.microsoft.com/office/powerpoint/2010/main" val="653915034"/>
       </p:ext>
     </p:extLst>
   </p:cSld>
   <p:clrMapOvr>
     <a:masterClrMapping/>
   </p:clrMapOvr>
+  <p:timing>
+    <p:tnLst>
+      <p:par>
+        <p:cTn id="1" dur="indefinite" restart="never" nodeType="tmRoot"/>
+      </p:par>
+    </p:tnLst>
+  </p:timing>
 </p:sld>
 </file>
 
@@ -7300,8 +8287,8 @@
         </p:nvSpPr>
         <p:spPr>
           <a:xfrm>
-            <a:off x="1141413" y="1041991"/>
-            <a:ext cx="9905998" cy="1049079"/>
+            <a:off x="0" y="123341"/>
+            <a:ext cx="1282700" cy="982445"/>
           </a:xfrm>
         </p:spPr>
         <p:txBody>
@@ -7309,81 +8296,91 @@
           <a:lstStyle/>
           <a:p>
             <a:r>
-              <a:rPr lang="en-US" dirty="0"/>
-              <a:t>X-means</a:t>
-            </a:r>
-          </a:p>
-        </p:txBody>
-      </p:sp>
-      <p:sp>
-        <p:nvSpPr>
-          <p:cNvPr id="3" name="Content Placeholder 2"/>
-          <p:cNvSpPr>
-            <a:spLocks noGrp="1"/>
-          </p:cNvSpPr>
-          <p:nvPr>
-            <p:ph idx="1"/>
-          </p:nvPr>
-        </p:nvSpPr>
-        <p:spPr>
-          <a:xfrm>
-            <a:off x="1141413" y="2197395"/>
-            <a:ext cx="9905998" cy="3593805"/>
+              <a:rPr lang="en-US" dirty="0" smtClean="0"/>
+              <a:t>ID3</a:t>
+            </a:r>
+            <a:br>
+              <a:rPr lang="en-US" dirty="0" smtClean="0"/>
+            </a:br>
+            <a:r>
+              <a:rPr lang="en-US" dirty="0" smtClean="0"/>
+              <a:t>Class</a:t>
+            </a:r>
+            <a:endParaRPr lang="en-US" dirty="0"/>
+          </a:p>
+        </p:txBody>
+      </p:sp>
+      <p:pic>
+        <p:nvPicPr>
+          <p:cNvPr id="7" name="Picture Placeholder 6"/>
+          <p:cNvPicPr>
+            <a:picLocks noGrp="1" noChangeAspect="1"/>
+          </p:cNvPicPr>
+          <p:nvPr>
+            <p:ph type="pic" idx="1"/>
+          </p:nvPr>
+        </p:nvPicPr>
+        <p:blipFill>
+          <a:blip r:embed="rId2">
+            <a:extLst>
+              <a:ext uri="{28A0092B-C50C-407E-A947-70E740481C1C}">
+                <a14:useLocalDpi xmlns:a14="http://schemas.microsoft.com/office/drawing/2010/main" val="0"/>
+              </a:ext>
+            </a:extLst>
+          </a:blip>
+          <a:srcRect t="489" b="489"/>
+          <a:stretch>
+            <a:fillRect/>
+          </a:stretch>
+        </p:blipFill>
+        <p:spPr>
+          <a:xfrm>
+            <a:off x="1282700" y="-19050"/>
+            <a:ext cx="10909300" cy="6904038"/>
+          </a:xfrm>
+        </p:spPr>
+      </p:pic>
+      <p:sp>
+        <p:nvSpPr>
+          <p:cNvPr id="4" name="Text Placeholder 3"/>
+          <p:cNvSpPr>
+            <a:spLocks noGrp="1"/>
+          </p:cNvSpPr>
+          <p:nvPr>
+            <p:ph type="body" sz="half" idx="2"/>
+          </p:nvPr>
+        </p:nvSpPr>
+        <p:spPr>
+          <a:xfrm>
+            <a:off x="34513" y="2920324"/>
+            <a:ext cx="977267" cy="1828800"/>
           </a:xfrm>
         </p:spPr>
         <p:txBody>
           <a:bodyPr/>
           <a:lstStyle/>
           <a:p>
-            <a:r>
-              <a:rPr lang="en-US" dirty="0"/>
-              <a:t>Parameters</a:t>
-            </a:r>
-          </a:p>
-          <a:p>
-            <a:endParaRPr lang="en-US" dirty="0"/>
-          </a:p>
-          <a:p>
-            <a:pPr lvl="1"/>
-            <a:r>
-              <a:rPr lang="en-US" dirty="0"/>
-              <a:t>Dataset </a:t>
-            </a:r>
-          </a:p>
-          <a:p>
-            <a:pPr lvl="1"/>
-            <a:endParaRPr lang="en-US" dirty="0"/>
-          </a:p>
-          <a:p>
-            <a:pPr lvl="1"/>
-            <a:r>
-              <a:rPr lang="en-US" dirty="0"/>
-              <a:t>Range true K is in</a:t>
-            </a:r>
-          </a:p>
-          <a:p>
-            <a:pPr lvl="1"/>
-            <a:endParaRPr lang="en-US" dirty="0"/>
-          </a:p>
-          <a:p>
-            <a:pPr lvl="1"/>
-            <a:r>
-              <a:rPr lang="en-US" dirty="0"/>
-              <a:t>Max number of K mean loops, optional </a:t>
-            </a:r>
+            <a:endParaRPr lang="en-US" dirty="0"/>
           </a:p>
         </p:txBody>
       </p:sp>
     </p:spTree>
     <p:extLst>
       <p:ext uri="{BB962C8B-B14F-4D97-AF65-F5344CB8AC3E}">
-        <p14:creationId xmlns:p14="http://schemas.microsoft.com/office/powerpoint/2010/main" val="831948700"/>
+        <p14:creationId xmlns:p14="http://schemas.microsoft.com/office/powerpoint/2010/main" val="3472208946"/>
       </p:ext>
     </p:extLst>
   </p:cSld>
   <p:clrMapOvr>
     <a:masterClrMapping/>
   </p:clrMapOvr>
+  <p:timing>
+    <p:tnLst>
+      <p:par>
+        <p:cTn id="1" dur="indefinite" restart="never" nodeType="tmRoot"/>
+      </p:par>
+    </p:tnLst>
+  </p:timing>
 </p:sld>
 </file>
 
@@ -7416,8 +8413,8 @@
         </p:nvSpPr>
         <p:spPr>
           <a:xfrm>
-            <a:off x="1141413" y="1041991"/>
-            <a:ext cx="9905998" cy="1049079"/>
+            <a:off x="213064" y="275363"/>
+            <a:ext cx="3116062" cy="656793"/>
           </a:xfrm>
         </p:spPr>
         <p:txBody>
@@ -7425,61 +8422,82 @@
           <a:lstStyle/>
           <a:p>
             <a:r>
-              <a:rPr lang="en-US" dirty="0"/>
-              <a:t>What X-means Does</a:t>
-            </a:r>
-          </a:p>
-        </p:txBody>
-      </p:sp>
-      <p:sp>
-        <p:nvSpPr>
-          <p:cNvPr id="3" name="Content Placeholder 2"/>
-          <p:cNvSpPr>
-            <a:spLocks noGrp="1"/>
-          </p:cNvSpPr>
-          <p:nvPr>
-            <p:ph idx="1"/>
-          </p:nvPr>
-        </p:nvSpPr>
-        <p:spPr>
-          <a:xfrm>
-            <a:off x="1141413" y="2197395"/>
-            <a:ext cx="9905998" cy="3593805"/>
+              <a:rPr lang="en-US" dirty="0" smtClean="0"/>
+              <a:t>ID3 Algorithm</a:t>
+            </a:r>
+            <a:endParaRPr lang="en-US" dirty="0"/>
+          </a:p>
+        </p:txBody>
+      </p:sp>
+      <p:pic>
+        <p:nvPicPr>
+          <p:cNvPr id="10" name="Picture Placeholder 9"/>
+          <p:cNvPicPr>
+            <a:picLocks noGrp="1" noChangeAspect="1"/>
+          </p:cNvPicPr>
+          <p:nvPr>
+            <p:ph type="pic" idx="1"/>
+          </p:nvPr>
+        </p:nvPicPr>
+        <p:blipFill rotWithShape="1">
+          <a:blip r:embed="rId2">
+            <a:extLst>
+              <a:ext uri="{28A0092B-C50C-407E-A947-70E740481C1C}">
+                <a14:useLocalDpi xmlns:a14="http://schemas.microsoft.com/office/drawing/2010/main" val="0"/>
+              </a:ext>
+            </a:extLst>
+          </a:blip>
+          <a:srcRect l="-12" t="514" r="43576" b="-514"/>
+          <a:stretch/>
+        </p:blipFill>
+        <p:spPr>
+          <a:xfrm>
+            <a:off x="3586579" y="0"/>
+            <a:ext cx="8605421" cy="6904038"/>
+          </a:xfrm>
+        </p:spPr>
+      </p:pic>
+      <p:sp>
+        <p:nvSpPr>
+          <p:cNvPr id="4" name="Text Placeholder 3"/>
+          <p:cNvSpPr>
+            <a:spLocks noGrp="1"/>
+          </p:cNvSpPr>
+          <p:nvPr>
+            <p:ph type="body" sz="half" idx="2"/>
+          </p:nvPr>
+        </p:nvSpPr>
+        <p:spPr>
+          <a:xfrm>
+            <a:off x="0" y="2206256"/>
+            <a:ext cx="744279" cy="1828800"/>
           </a:xfrm>
         </p:spPr>
         <p:txBody>
           <a:bodyPr/>
           <a:lstStyle/>
           <a:p>
-            <a:r>
-              <a:rPr lang="en-US" dirty="0"/>
-              <a:t>Improves on K-Means by letting K be a range of numbers </a:t>
-            </a:r>
-          </a:p>
-          <a:p>
-            <a:r>
-              <a:rPr lang="en-US" dirty="0"/>
-              <a:t> Helps the problem of finding only the local minima </a:t>
-            </a:r>
-          </a:p>
-          <a:p>
-            <a:r>
-              <a:rPr lang="en-US" dirty="0"/>
-              <a:t>Can be sped up using K-D trees</a:t>
-            </a:r>
+            <a:endParaRPr lang="en-US" dirty="0"/>
           </a:p>
         </p:txBody>
       </p:sp>
     </p:spTree>
     <p:extLst>
       <p:ext uri="{BB962C8B-B14F-4D97-AF65-F5344CB8AC3E}">
-        <p14:creationId xmlns:p14="http://schemas.microsoft.com/office/powerpoint/2010/main" val="3217976806"/>
+        <p14:creationId xmlns:p14="http://schemas.microsoft.com/office/powerpoint/2010/main" val="2448481701"/>
       </p:ext>
     </p:extLst>
   </p:cSld>
   <p:clrMapOvr>
     <a:masterClrMapping/>
   </p:clrMapOvr>
+  <p:timing>
+    <p:tnLst>
+      <p:par>
+        <p:cTn id="1" dur="indefinite" restart="never" nodeType="tmRoot"/>
+      </p:par>
+    </p:tnLst>
+  </p:timing>
 </p:sld>
 </file>
 

</xml_diff>